<commit_message>
Initialize WordGenProject with an empty __init__.py file
</commit_message>
<xml_diff>
--- a/Output/666/test.pptx
+++ b/Output/666/test.pptx
@@ -5689,7 +5689,7 @@
           <a:lstStyle/>
           <a:p>
             <a:r>
-              <a:t>追求心仪女生的策略与技巧</a:t>
+              <a:t>如何追到喜欢的女生</a:t>
             </a:r>
           </a:p>
         </p:txBody>
@@ -5710,7 +5710,7 @@
           <a:lstStyle/>
           <a:p>
             <a:r>
-              <a:t>从了解她到赢得芳心</a:t>
+              <a:t>策略与技巧分享</a:t>
             </a:r>
           </a:p>
         </p:txBody>
@@ -5771,19 +5771,19 @@
           <a:p>
             <a:pPr/>
             <a:r>
-              <a:t>1. 第一步：了解她</a:t>
+              <a:t>1. 第一步：建立初步联系</a:t>
             </a:r>
           </a:p>
           <a:p>
             <a:pPr/>
             <a:r>
-              <a:t>2. 第二步：建立联系</a:t>
+              <a:t>2. 第二步：深入了解与增进感情</a:t>
             </a:r>
           </a:p>
           <a:p>
             <a:pPr/>
             <a:r>
-              <a:t>3. 第三步：加深感情</a:t>
+              <a:t>3. 第三步：表达你的感情</a:t>
             </a:r>
           </a:p>
           <a:p>
@@ -5828,36 +5828,19 @@
           <a:lstStyle/>
           <a:p>
             <a:r>
-              <a:t>第一步：了解她</a:t>
-            </a:r>
-          </a:p>
-        </p:txBody>
-      </p:sp>
-      <p:sp>
-        <p:nvSpPr>
-          <p:cNvPr id="3" name="Text Placeholder 2"/>
-          <p:cNvSpPr>
-            <a:spLocks noGrp="1"/>
-          </p:cNvSpPr>
-          <p:nvPr>
-            <p:ph type="body" idx="13" sz="quarter"/>
-          </p:nvPr>
-        </p:nvSpPr>
-        <p:spPr/>
-        <p:txBody>
-          <a:bodyPr/>
-          <a:lstStyle/>
-          <a:p/>
-        </p:txBody>
-      </p:sp>
-      <p:sp>
-        <p:nvSpPr>
-          <p:cNvPr id="4" name="Text Placeholder 3"/>
-          <p:cNvSpPr>
-            <a:spLocks noGrp="1"/>
-          </p:cNvSpPr>
-          <p:nvPr>
-            <p:ph type="body" idx="1"/>
+              <a:t>第一步：建立初步联系</a:t>
+            </a:r>
+          </a:p>
+        </p:txBody>
+      </p:sp>
+      <p:sp>
+        <p:nvSpPr>
+          <p:cNvPr id="3" name="Content Placeholder 2"/>
+          <p:cNvSpPr>
+            <a:spLocks noGrp="1"/>
+          </p:cNvSpPr>
+          <p:nvPr>
+            <p:ph idx="1"/>
           </p:nvPr>
         </p:nvSpPr>
         <p:spPr/>
@@ -5867,19 +5850,19 @@
           <a:p>
             <a:pPr/>
             <a:r>
-              <a:t>观察她的兴趣爱好</a:t>
+              <a:t>找到共同兴趣，作为话题切入点</a:t>
             </a:r>
           </a:p>
           <a:p>
             <a:pPr/>
             <a:r>
-              <a:t>留意她的朋友圈动态</a:t>
+              <a:t>保持自然交流，避免过度紧张</a:t>
             </a:r>
           </a:p>
           <a:p>
             <a:pPr/>
             <a:r>
-              <a:t>尝试共同话题</a:t>
+              <a:t>适当展示你的个性与优点</a:t>
             </a:r>
           </a:p>
         </p:txBody>
@@ -5918,7 +5901,7 @@
           <a:lstStyle/>
           <a:p>
             <a:r>
-              <a:t>第二步：建立联系</a:t>
+              <a:t>第二步：深入了解与增进感情</a:t>
             </a:r>
           </a:p>
         </p:txBody>
@@ -5930,35 +5913,18 @@
             <a:spLocks noGrp="1"/>
           </p:cNvSpPr>
           <p:nvPr>
-            <p:ph idx="1" sz="half"/>
-          </p:nvPr>
-        </p:nvSpPr>
-        <p:spPr/>
-        <p:txBody>
-          <a:bodyPr/>
-          <a:lstStyle/>
-          <a:p>
-            <a:r>
-              <a:t>通过社交平台或朋友介绍主动接触，找到合适的机会邀请她一起参加活动或共进晚餐，注意保持礼貌和尊重，让对方感到舒适和轻松。</a:t>
-            </a:r>
-          </a:p>
-        </p:txBody>
-      </p:sp>
-      <p:sp>
-        <p:nvSpPr>
-          <p:cNvPr id="4" name="Content Placeholder 3"/>
-          <p:cNvSpPr>
-            <a:spLocks noGrp="1"/>
-          </p:cNvSpPr>
-          <p:nvPr>
-            <p:ph idx="2" sz="half"/>
-          </p:nvPr>
-        </p:nvSpPr>
-        <p:spPr/>
-        <p:txBody>
-          <a:bodyPr/>
-          <a:lstStyle/>
-          <a:p/>
+            <p:ph idx="1"/>
+          </p:nvPr>
+        </p:nvSpPr>
+        <p:spPr/>
+        <p:txBody>
+          <a:bodyPr/>
+          <a:lstStyle/>
+          <a:p>
+            <a:r>
+              <a:t>在初步接触后，尝试通过更多活动加深了解，比如共同参加兴趣小组或活动。注意观察对方的兴趣爱好，并适时提供帮助或建议，以此增进彼此间的感情。</a:t>
+            </a:r>
+          </a:p>
         </p:txBody>
       </p:sp>
     </p:spTree>
@@ -5995,7 +5961,7 @@
           <a:lstStyle/>
           <a:p>
             <a:r>
-              <a:t>第三步：加深感情</a:t>
+              <a:t>第三步：表达你的感情</a:t>
             </a:r>
           </a:p>
         </p:txBody>
@@ -6033,12 +5999,12 @@
           <a:lstStyle/>
           <a:p>
             <a:r>
-              <a:t>共享美好时光</a:t>
-            </a:r>
-          </a:p>
-          <a:p>
-            <a:r>
-              <a:t>创造更多共同回忆，如旅行、运动或其他有意义的活动，增加彼此间的默契与理解。</a:t>
+              <a:t>时机与方式的选择</a:t>
+            </a:r>
+          </a:p>
+          <a:p>
+            <a:r>
+              <a:t>选择一个合适的时机，如她心情愉快时，向她表达你对她的好感。可以通过直接对话或写信等方式进行。重要的是要真诚，让她感受到你的真心。</a:t>
             </a:r>
           </a:p>
         </p:txBody>
@@ -6078,6 +6044,27 @@
           <a:p>
             <a:r>
               <a:t>总结</a:t>
+            </a:r>
+          </a:p>
+        </p:txBody>
+      </p:sp>
+      <p:sp>
+        <p:nvSpPr>
+          <p:cNvPr id="3" name="Content Placeholder 2"/>
+          <p:cNvSpPr>
+            <a:spLocks noGrp="1"/>
+          </p:cNvSpPr>
+          <p:nvPr>
+            <p:ph idx="1"/>
+          </p:nvPr>
+        </p:nvSpPr>
+        <p:spPr/>
+        <p:txBody>
+          <a:bodyPr/>
+          <a:lstStyle/>
+          <a:p>
+            <a:r>
+              <a:t>追女生需要耐心与细心，首先要建立起初步的联系，然后通过共同的活动增进感情，最后适时地表达自己的感情。记住，真诚是关键。</a:t>
             </a:r>
           </a:p>
         </p:txBody>

</xml_diff>

<commit_message>
feat: Add asynchronous PPT and Word document generation endpoints with task status tracking
</commit_message>
<xml_diff>
--- a/Output/666/test.pptx
+++ b/Output/666/test.pptx
@@ -5710,7 +5710,7 @@
           <a:lstStyle/>
           <a:p>
             <a:r>
-              <a:t>策略与技巧分享</a:t>
+              <a:t>实用攻略与技巧分享</a:t>
             </a:r>
           </a:p>
         </p:txBody>
@@ -5771,25 +5771,25 @@
           <a:p>
             <a:pPr/>
             <a:r>
-              <a:t>1. 第一步：建立初步联系</a:t>
+              <a:t>1. 第一步：了解与沟通</a:t>
             </a:r>
           </a:p>
           <a:p>
             <a:pPr/>
             <a:r>
-              <a:t>2. 第二步：深入了解与增进感情</a:t>
+              <a:t>2. 第二步：建立联系</a:t>
             </a:r>
           </a:p>
           <a:p>
             <a:pPr/>
             <a:r>
-              <a:t>3. 第三步：表达你的感情</a:t>
+              <a:t>3. 第三步：展现自我</a:t>
             </a:r>
           </a:p>
           <a:p>
             <a:pPr/>
             <a:r>
-              <a:t>4. 总结</a:t>
+              <a:t>4. 第四步：共同活动</a:t>
             </a:r>
           </a:p>
         </p:txBody>
@@ -5828,19 +5828,36 @@
           <a:lstStyle/>
           <a:p>
             <a:r>
-              <a:t>第一步：建立初步联系</a:t>
-            </a:r>
-          </a:p>
-        </p:txBody>
-      </p:sp>
-      <p:sp>
-        <p:nvSpPr>
-          <p:cNvPr id="3" name="Content Placeholder 2"/>
-          <p:cNvSpPr>
-            <a:spLocks noGrp="1"/>
-          </p:cNvSpPr>
-          <p:nvPr>
-            <p:ph idx="1"/>
+              <a:t>第一步：了解与沟通</a:t>
+            </a:r>
+          </a:p>
+        </p:txBody>
+      </p:sp>
+      <p:sp>
+        <p:nvSpPr>
+          <p:cNvPr id="3" name="Text Placeholder 2"/>
+          <p:cNvSpPr>
+            <a:spLocks noGrp="1"/>
+          </p:cNvSpPr>
+          <p:nvPr>
+            <p:ph type="body" idx="13"/>
+          </p:nvPr>
+        </p:nvSpPr>
+        <p:spPr/>
+        <p:txBody>
+          <a:bodyPr/>
+          <a:lstStyle/>
+          <a:p/>
+        </p:txBody>
+      </p:sp>
+      <p:sp>
+        <p:nvSpPr>
+          <p:cNvPr id="4" name="Text Placeholder 3"/>
+          <p:cNvSpPr>
+            <a:spLocks noGrp="1"/>
+          </p:cNvSpPr>
+          <p:nvPr>
+            <p:ph type="body" idx="1"/>
           </p:nvPr>
         </p:nvSpPr>
         <p:spPr/>
@@ -5850,19 +5867,19 @@
           <a:p>
             <a:pPr/>
             <a:r>
-              <a:t>找到共同兴趣，作为话题切入点</a:t>
+              <a:t>观察她的兴趣爱好</a:t>
             </a:r>
           </a:p>
           <a:p>
             <a:pPr/>
             <a:r>
-              <a:t>保持自然交流，避免过度紧张</a:t>
+              <a:t>寻找共同话题</a:t>
             </a:r>
           </a:p>
           <a:p>
             <a:pPr/>
             <a:r>
-              <a:t>适当展示你的个性与优点</a:t>
+              <a:t>保持真诚的态度</a:t>
             </a:r>
           </a:p>
         </p:txBody>
@@ -5901,28 +5918,45 @@
           <a:lstStyle/>
           <a:p>
             <a:r>
-              <a:t>第二步：深入了解与增进感情</a:t>
-            </a:r>
-          </a:p>
-        </p:txBody>
-      </p:sp>
-      <p:sp>
-        <p:nvSpPr>
-          <p:cNvPr id="3" name="Content Placeholder 2"/>
-          <p:cNvSpPr>
-            <a:spLocks noGrp="1"/>
-          </p:cNvSpPr>
-          <p:nvPr>
-            <p:ph idx="1"/>
-          </p:nvPr>
-        </p:nvSpPr>
-        <p:spPr/>
-        <p:txBody>
-          <a:bodyPr/>
-          <a:lstStyle/>
-          <a:p>
-            <a:r>
-              <a:t>在初步接触后，尝试通过更多活动加深了解，比如共同参加兴趣小组或活动。注意观察对方的兴趣爱好，并适时提供帮助或建议，以此增进彼此间的感情。</a:t>
+              <a:t>第二步：建立联系</a:t>
+            </a:r>
+          </a:p>
+        </p:txBody>
+      </p:sp>
+      <p:sp>
+        <p:nvSpPr>
+          <p:cNvPr id="3" name="Text Placeholder 2"/>
+          <p:cNvSpPr>
+            <a:spLocks noGrp="1"/>
+          </p:cNvSpPr>
+          <p:nvPr>
+            <p:ph type="body" idx="13"/>
+          </p:nvPr>
+        </p:nvSpPr>
+        <p:spPr/>
+        <p:txBody>
+          <a:bodyPr/>
+          <a:lstStyle/>
+          <a:p/>
+        </p:txBody>
+      </p:sp>
+      <p:sp>
+        <p:nvSpPr>
+          <p:cNvPr id="4" name="Text Placeholder 3"/>
+          <p:cNvSpPr>
+            <a:spLocks noGrp="1"/>
+          </p:cNvSpPr>
+          <p:nvPr>
+            <p:ph type="body" idx="1"/>
+          </p:nvPr>
+        </p:nvSpPr>
+        <p:spPr/>
+        <p:txBody>
+          <a:bodyPr/>
+          <a:lstStyle/>
+          <a:p>
+            <a:r>
+              <a:t>通过社交媒体、朋友介绍或其他方式主动接触她，保持联系频率适中，避免过于频繁而产生压力感。</a:t>
             </a:r>
           </a:p>
         </p:txBody>
@@ -5961,50 +5995,33 @@
           <a:lstStyle/>
           <a:p>
             <a:r>
-              <a:t>第三步：表达你的感情</a:t>
-            </a:r>
-          </a:p>
-        </p:txBody>
-      </p:sp>
-      <p:sp>
-        <p:nvSpPr>
-          <p:cNvPr id="3" name="Text Placeholder 2"/>
-          <p:cNvSpPr>
-            <a:spLocks noGrp="1"/>
-          </p:cNvSpPr>
-          <p:nvPr>
-            <p:ph type="body" idx="13"/>
-          </p:nvPr>
-        </p:nvSpPr>
-        <p:spPr/>
-        <p:txBody>
-          <a:bodyPr/>
-          <a:lstStyle/>
-          <a:p/>
-        </p:txBody>
-      </p:sp>
-      <p:sp>
-        <p:nvSpPr>
-          <p:cNvPr id="4" name="Text Placeholder 3"/>
-          <p:cNvSpPr>
-            <a:spLocks noGrp="1"/>
-          </p:cNvSpPr>
-          <p:nvPr>
-            <p:ph type="body" idx="1"/>
-          </p:nvPr>
-        </p:nvSpPr>
-        <p:spPr/>
-        <p:txBody>
-          <a:bodyPr/>
-          <a:lstStyle/>
-          <a:p>
-            <a:r>
-              <a:t>时机与方式的选择</a:t>
-            </a:r>
-          </a:p>
-          <a:p>
-            <a:r>
-              <a:t>选择一个合适的时机，如她心情愉快时，向她表达你对她的好感。可以通过直接对话或写信等方式进行。重要的是要真诚，让她感受到你的真心。</a:t>
+              <a:t>第三步：展现自我</a:t>
+            </a:r>
+          </a:p>
+        </p:txBody>
+      </p:sp>
+      <p:sp>
+        <p:nvSpPr>
+          <p:cNvPr id="3" name="Content Placeholder 2"/>
+          <p:cNvSpPr>
+            <a:spLocks noGrp="1"/>
+          </p:cNvSpPr>
+          <p:nvPr>
+            <p:ph idx="1"/>
+          </p:nvPr>
+        </p:nvSpPr>
+        <p:spPr/>
+        <p:txBody>
+          <a:bodyPr/>
+          <a:lstStyle/>
+          <a:p>
+            <a:r>
+              <a:t>展现个人魅力</a:t>
+            </a:r>
+          </a:p>
+          <a:p>
+            <a:r>
+              <a:t>通过自己的兴趣爱好、特长展示个性，让她看到你独特的魅力和价值。</a:t>
             </a:r>
           </a:p>
         </p:txBody>
@@ -6043,28 +6060,28 @@
           <a:lstStyle/>
           <a:p>
             <a:r>
-              <a:t>总结</a:t>
-            </a:r>
-          </a:p>
-        </p:txBody>
-      </p:sp>
-      <p:sp>
-        <p:nvSpPr>
-          <p:cNvPr id="3" name="Content Placeholder 2"/>
-          <p:cNvSpPr>
-            <a:spLocks noGrp="1"/>
-          </p:cNvSpPr>
-          <p:nvPr>
-            <p:ph idx="1"/>
-          </p:nvPr>
-        </p:nvSpPr>
-        <p:spPr/>
-        <p:txBody>
-          <a:bodyPr/>
-          <a:lstStyle/>
-          <a:p>
-            <a:r>
-              <a:t>追女生需要耐心与细心，首先要建立起初步的联系，然后通过共同的活动增进感情，最后适时地表达自己的感情。记住，真诚是关键。</a:t>
+              <a:t>第四步：共同活动</a:t>
+            </a:r>
+          </a:p>
+        </p:txBody>
+      </p:sp>
+      <p:sp>
+        <p:nvSpPr>
+          <p:cNvPr id="3" name="Text Placeholder 2"/>
+          <p:cNvSpPr>
+            <a:spLocks noGrp="1"/>
+          </p:cNvSpPr>
+          <p:nvPr>
+            <p:ph type="body" idx="1"/>
+          </p:nvPr>
+        </p:nvSpPr>
+        <p:spPr/>
+        <p:txBody>
+          <a:bodyPr/>
+          <a:lstStyle/>
+          <a:p>
+            <a:r>
+              <a:t>邀请她参与一些共同感兴趣的活动，如户外运动、看电影等，加深彼此之间的了解与感情。</a:t>
             </a:r>
           </a:p>
         </p:txBody>

</xml_diff>

<commit_message>
feat: Enhance JSON response handling and improve prompt clarity for PPT and Word generation
</commit_message>
<xml_diff>
--- a/Output/666/test.pptx
+++ b/Output/666/test.pptx
@@ -10,6 +10,9 @@
     <p:sldId id="258" r:id="rId8"/>
     <p:sldId id="259" r:id="rId9"/>
     <p:sldId id="260" r:id="rId10"/>
+    <p:sldId id="261" r:id="rId11"/>
+    <p:sldId id="262" r:id="rId12"/>
+    <p:sldId id="263" r:id="rId13"/>
   </p:sldIdLst>
   <p:sldSz cx="12192000" cy="6858000"/>
   <p:notesSz cx="6858000" cy="9144000"/>
@@ -2465,7 +2468,7 @@
           <a:lstStyle/>
           <a:p>
             <a:r>
-              <a:t>香港喺中醫藥全球發展中嘅橋樑作用</a:t>
+              <a:t>PID 控制的“抗飽和（Anti-Windup）機制”</a:t>
             </a:r>
           </a:p>
         </p:txBody>
@@ -2486,7 +2489,7 @@
           <a:lstStyle/>
           <a:p>
             <a:r>
-              <a:t>促進中西醫藥文化融合</a:t>
+              <a:t>原理、數學建模與工程實現</a:t>
             </a:r>
           </a:p>
         </p:txBody>
@@ -2547,19 +2550,37 @@
           <a:p>
             <a:pPr/>
             <a:r>
-              <a:t>1. 香港作為中醫藥橋樑嘅角色</a:t>
+              <a:t>1. 问题背景与数学模型</a:t>
             </a:r>
           </a:p>
           <a:p>
             <a:pPr/>
             <a:r>
-              <a:t>2. 香港對中醫藥國際貿易嘅促進作用</a:t>
+              <a:t>2. 抗饱和目标与经典抗饱和策略</a:t>
             </a:r>
           </a:p>
           <a:p>
             <a:pPr/>
             <a:r>
-              <a:t>3. 結語</a:t>
+              <a:t>3. 经典抗饱和策略：Back-Calculation</a:t>
+            </a:r>
+          </a:p>
+          <a:p>
+            <a:pPr/>
+            <a:r>
+              <a:t>4. 稳定性分析与离散实现</a:t>
+            </a:r>
+          </a:p>
+          <a:p>
+            <a:pPr/>
+            <a:r>
+              <a:t>5. 工程补充与小结</a:t>
+            </a:r>
+          </a:p>
+          <a:p>
+            <a:pPr/>
+            <a:r>
+              <a:t>6. 總結</a:t>
             </a:r>
           </a:p>
         </p:txBody>
@@ -2584,21 +2605,55 @@
       <p:grpSpPr/>
       <p:sp>
         <p:nvSpPr>
-          <p:cNvPr id="2" name="Title 1"/>
-          <p:cNvSpPr>
-            <a:spLocks noGrp="1"/>
-          </p:cNvSpPr>
-          <p:nvPr>
-            <p:ph type="title"/>
-          </p:nvPr>
-        </p:nvSpPr>
-        <p:spPr/>
-        <p:txBody>
-          <a:bodyPr/>
-          <a:lstStyle/>
-          <a:p>
-            <a:r>
-              <a:t>香港作為中醫藥橋樑嘅角色</a:t>
+          <p:cNvPr id="2" name="Vertical Title 1"/>
+          <p:cNvSpPr>
+            <a:spLocks noGrp="1"/>
+          </p:cNvSpPr>
+          <p:nvPr>
+            <p:ph type="title" orient="vert"/>
+          </p:nvPr>
+        </p:nvSpPr>
+        <p:spPr/>
+        <p:txBody>
+          <a:bodyPr/>
+          <a:lstStyle/>
+          <a:p>
+            <a:r>
+              <a:t>问题背景与数学模型</a:t>
+            </a:r>
+          </a:p>
+        </p:txBody>
+      </p:sp>
+      <p:sp>
+        <p:nvSpPr>
+          <p:cNvPr id="3" name="Vertical Text Placeholder 2"/>
+          <p:cNvSpPr>
+            <a:spLocks noGrp="1"/>
+          </p:cNvSpPr>
+          <p:nvPr>
+            <p:ph type="body" idx="1" orient="vert"/>
+          </p:nvPr>
+        </p:nvSpPr>
+        <p:spPr/>
+        <p:txBody>
+          <a:bodyPr/>
+          <a:lstStyle/>
+          <a:p>
+            <a:pPr/>
+            <a:r>
+              <a:t>积分饱和（Integral Wind-up）现象：执行器达到物理极限时，积分项 I(t) 迅速增大导致系统超调与振荡。</a:t>
+            </a:r>
+          </a:p>
+          <a:p>
+            <a:pPr/>
+            <a:r>
+              <a:t>标准 PID 控制器数学模型：$u(t) = K_p e(t) + K_i \int_0^t e(\tau)d\tau + K_d \frac{de(t)}{dt}$</a:t>
+            </a:r>
+          </a:p>
+          <a:p>
+            <a:pPr/>
+            <a:r>
+              <a:t>饱和时实际输出 $u_a(t) = sat(u(t)) = sign(u(t)) \cdot u_{max}$，导致 $u(t) \neq u_a(t)$</a:t>
             </a:r>
           </a:p>
         </p:txBody>
@@ -2637,7 +2692,7 @@
           <a:lstStyle/>
           <a:p>
             <a:r>
-              <a:t>香港對中醫藥國際貿易嘅促進作用</a:t>
+              <a:t>抗饱和目标与经典抗饱和策略</a:t>
             </a:r>
           </a:p>
         </p:txBody>
@@ -2658,26 +2713,14 @@
           <a:lstStyle/>
           <a:p>
             <a:r>
-              <a:t>香港作為國際貿易中心，促進高質量中醫藥材料嘅國際貿易，提升中醫藥喺全球嘅認可度同發展。</a:t>
-            </a:r>
-          </a:p>
-        </p:txBody>
-      </p:sp>
-      <p:sp>
-        <p:nvSpPr>
-          <p:cNvPr id="4" name="Text Placeholder 3"/>
-          <p:cNvSpPr>
-            <a:spLocks noGrp="1"/>
-          </p:cNvSpPr>
-          <p:nvPr>
-            <p:ph type="body" idx="2" sz="half"/>
-          </p:nvPr>
-        </p:nvSpPr>
-        <p:spPr/>
-        <p:txBody>
-          <a:bodyPr/>
-          <a:lstStyle/>
-          <a:p/>
+              <a:t>抗饱和目标</a:t>
+            </a:r>
+          </a:p>
+          <a:p>
+            <a:r>
+              <a:t>在饱和阶段抑制积分项继续增长；在退出饱和后，系统应快速、平滑地回到线性工作区。</a:t>
+            </a:r>
+          </a:p>
         </p:txBody>
       </p:sp>
     </p:spTree>
@@ -2714,28 +2757,243 @@
           <a:lstStyle/>
           <a:p>
             <a:r>
-              <a:t>結語</a:t>
-            </a:r>
-          </a:p>
-        </p:txBody>
-      </p:sp>
-      <p:sp>
-        <p:nvSpPr>
-          <p:cNvPr id="3" name="Text Placeholder 2"/>
-          <p:cNvSpPr>
-            <a:spLocks noGrp="1"/>
-          </p:cNvSpPr>
-          <p:nvPr>
-            <p:ph type="body" idx="1"/>
-          </p:nvPr>
-        </p:nvSpPr>
-        <p:spPr/>
-        <p:txBody>
-          <a:bodyPr/>
-          <a:lstStyle/>
-          <a:p>
-            <a:r>
-              <a:t>總結香港喺中醫藥全球發展中嘅重要角色，展望未來中醫藥喺全球嘅發展前景。</a:t>
+              <a:t>经典抗饱和策略：Back-Calculation</a:t>
+            </a:r>
+          </a:p>
+        </p:txBody>
+      </p:sp>
+      <p:sp>
+        <p:nvSpPr>
+          <p:cNvPr id="3" name="Content Placeholder 2"/>
+          <p:cNvSpPr>
+            <a:spLocks noGrp="1"/>
+          </p:cNvSpPr>
+          <p:nvPr>
+            <p:ph idx="1"/>
+          </p:nvPr>
+        </p:nvSpPr>
+        <p:spPr/>
+        <p:txBody>
+          <a:bodyPr/>
+          <a:lstStyle/>
+          <a:p>
+            <a:r>
+              <a:t>在标准 PID 之后插入“抗饱和反馈回路”，数学描述：$e_i(t) = e(t) + K_{aw}(u_a(t) - u(t))$，其中 $K_{aw}$ 为抗饱和增益（1/T_t，T_t 称为跟踪时间常数）。</a:t>
+            </a:r>
+          </a:p>
+        </p:txBody>
+      </p:sp>
+      <p:sp>
+        <p:nvSpPr>
+          <p:cNvPr id="4" name="Text Placeholder 3"/>
+          <p:cNvSpPr>
+            <a:spLocks noGrp="1"/>
+          </p:cNvSpPr>
+          <p:nvPr>
+            <p:ph type="body" idx="2" sz="half"/>
+          </p:nvPr>
+        </p:nvSpPr>
+        <p:spPr/>
+        <p:txBody>
+          <a:bodyPr/>
+          <a:lstStyle/>
+          <a:p/>
+        </p:txBody>
+      </p:sp>
+    </p:spTree>
+  </p:cSld>
+  <p:clrMapOvr>
+    <a:masterClrMapping/>
+  </p:clrMapOvr>
+</p:sld>
+</file>
+
+<file path=ppt/slides/slide6.xml><?xml version="1.0" encoding="utf-8"?>
+<p:sld xmlns:a="http://schemas.openxmlformats.org/drawingml/2006/main" xmlns:p="http://schemas.openxmlformats.org/presentationml/2006/main" xmlns:r="http://schemas.openxmlformats.org/officeDocument/2006/relationships">
+  <p:cSld>
+    <p:spTree>
+      <p:nvGrpSpPr>
+        <p:cNvPr id="1" name=""/>
+        <p:cNvGrpSpPr/>
+        <p:nvPr/>
+      </p:nvGrpSpPr>
+      <p:grpSpPr/>
+      <p:sp>
+        <p:nvSpPr>
+          <p:cNvPr id="2" name="Title 1"/>
+          <p:cNvSpPr>
+            <a:spLocks noGrp="1"/>
+          </p:cNvSpPr>
+          <p:nvPr>
+            <p:ph type="title"/>
+          </p:nvPr>
+        </p:nvSpPr>
+        <p:spPr/>
+        <p:txBody>
+          <a:bodyPr/>
+          <a:lstStyle/>
+          <a:p>
+            <a:r>
+              <a:t>稳定性分析与离散实现</a:t>
+            </a:r>
+          </a:p>
+        </p:txBody>
+      </p:sp>
+      <p:sp>
+        <p:nvSpPr>
+          <p:cNvPr id="3" name="Vertical Text Placeholder 2"/>
+          <p:cNvSpPr>
+            <a:spLocks noGrp="1"/>
+          </p:cNvSpPr>
+          <p:nvPr>
+            <p:ph type="body" idx="1" orient="vert"/>
+          </p:nvPr>
+        </p:nvSpPr>
+        <p:spPr/>
+        <p:txBody>
+          <a:bodyPr/>
+          <a:lstStyle/>
+          <a:p>
+            <a:pPr/>
+            <a:r>
+              <a:t>线性化假设：$G_{aw}(s) = \frac{K_{aw}}{s + K_{aw}}$，抗饱和回路自身稳定；闭环稳定性由线性 PID 设计与 $K_{aw}$ 共同决定。</a:t>
+            </a:r>
+          </a:p>
+          <a:p>
+            <a:pPr/>
+            <a:r>
+              <a:t>推荐整定：$T_t \approx \sqrt{T_i T_d}$（Åström-Hägglund 规则），其中 $T_i = \frac{K_p}{K_i}$，$T_d = \frac{K_d}{K_p}$。</a:t>
+            </a:r>
+          </a:p>
+          <a:p>
+            <a:pPr/>
+            <a:r>
+              <a:t>离散实现（位置式算法）：伪代码（C 语法）展示</a:t>
+            </a:r>
+          </a:p>
+        </p:txBody>
+      </p:sp>
+    </p:spTree>
+  </p:cSld>
+  <p:clrMapOvr>
+    <a:masterClrMapping/>
+  </p:clrMapOvr>
+</p:sld>
+</file>
+
+<file path=ppt/slides/slide7.xml><?xml version="1.0" encoding="utf-8"?>
+<p:sld xmlns:a="http://schemas.openxmlformats.org/drawingml/2006/main" xmlns:p="http://schemas.openxmlformats.org/presentationml/2006/main" xmlns:r="http://schemas.openxmlformats.org/officeDocument/2006/relationships">
+  <p:cSld>
+    <p:spTree>
+      <p:nvGrpSpPr>
+        <p:cNvPr id="1" name=""/>
+        <p:cNvGrpSpPr/>
+        <p:nvPr/>
+      </p:nvGrpSpPr>
+      <p:grpSpPr/>
+      <p:sp>
+        <p:nvSpPr>
+          <p:cNvPr id="2" name="Title 1"/>
+          <p:cNvSpPr>
+            <a:spLocks noGrp="1"/>
+          </p:cNvSpPr>
+          <p:nvPr>
+            <p:ph type="title"/>
+          </p:nvPr>
+        </p:nvSpPr>
+        <p:spPr/>
+        <p:txBody>
+          <a:bodyPr/>
+          <a:lstStyle/>
+          <a:p>
+            <a:r>
+              <a:t>工程补充与小结</a:t>
+            </a:r>
+          </a:p>
+        </p:txBody>
+      </p:sp>
+      <p:sp>
+        <p:nvSpPr>
+          <p:cNvPr id="3" name="Vertical Text Placeholder 2"/>
+          <p:cNvSpPr>
+            <a:spLocks noGrp="1"/>
+          </p:cNvSpPr>
+          <p:nvPr>
+            <p:ph type="body" idx="1" orient="vert"/>
+          </p:nvPr>
+        </p:nvSpPr>
+        <p:spPr/>
+        <p:txBody>
+          <a:bodyPr/>
+          <a:lstStyle/>
+          <a:p>
+            <a:r>
+              <a:t>工程补充</a:t>
+            </a:r>
+          </a:p>
+          <a:p>
+            <a:r>
+              <a:t>对多变量系统，可将抗饱和扩展为“方向保持”算法（Directional Anti-Windup）。实际调试时，可通过阶跃测试观测：饱和阶段 I 分量应被限制；退出饱和后调节时间应缩短。对伺服电机，可结合电流环限幅、速度前馈，实现级联抗饱和。</a:t>
+            </a:r>
+          </a:p>
+        </p:txBody>
+      </p:sp>
+    </p:spTree>
+  </p:cSld>
+  <p:clrMapOvr>
+    <a:masterClrMapping/>
+  </p:clrMapOvr>
+</p:sld>
+</file>
+
+<file path=ppt/slides/slide8.xml><?xml version="1.0" encoding="utf-8"?>
+<p:sld xmlns:a="http://schemas.openxmlformats.org/drawingml/2006/main" xmlns:p="http://schemas.openxmlformats.org/presentationml/2006/main" xmlns:r="http://schemas.openxmlformats.org/officeDocument/2006/relationships">
+  <p:cSld>
+    <p:spTree>
+      <p:nvGrpSpPr>
+        <p:cNvPr id="1" name=""/>
+        <p:cNvGrpSpPr/>
+        <p:nvPr/>
+      </p:nvGrpSpPr>
+      <p:grpSpPr/>
+      <p:sp>
+        <p:nvSpPr>
+          <p:cNvPr id="2" name="Title 1"/>
+          <p:cNvSpPr>
+            <a:spLocks noGrp="1"/>
+          </p:cNvSpPr>
+          <p:nvPr>
+            <p:ph type="title"/>
+          </p:nvPr>
+        </p:nvSpPr>
+        <p:spPr/>
+        <p:txBody>
+          <a:bodyPr/>
+          <a:lstStyle/>
+          <a:p>
+            <a:r>
+              <a:t>總結</a:t>
+            </a:r>
+          </a:p>
+        </p:txBody>
+      </p:sp>
+      <p:sp>
+        <p:nvSpPr>
+          <p:cNvPr id="3" name="Vertical Text Placeholder 2"/>
+          <p:cNvSpPr>
+            <a:spLocks noGrp="1"/>
+          </p:cNvSpPr>
+          <p:nvPr>
+            <p:ph type="body" idx="1" orient="vert"/>
+          </p:nvPr>
+        </p:nvSpPr>
+        <p:spPr/>
+        <p:txBody>
+          <a:bodyPr/>
+          <a:lstStyle/>
+          <a:p>
+            <a:r>
+              <a:t>抗饱和不是额外“补丁”，而是 PID 控制器在工程可实施性上的必要组成部分；其设计应遵循：(1) 建立饱和非线性模型；(2) 选择匹配的抗饱和结构（Back-Calculation、Clamping、Observer-based 等）；(3) 通过线性化或小增益定理验证稳定性；(4) 在实际硬件上闭环验证动态性能与鲁棒性。</a:t>
             </a:r>
           </a:p>
         </p:txBody>

</xml_diff>